<commit_message>
September version of text and slides. Pre-course for 2017-2018. Still to be improved.
git-svn-id: https://svn.code.sf.net/p/cpp-lects-rus/code/trunk@220 39143b06-f351-456c-9f92-4cd32fad6823
</commit_message>
<xml_diff>
--- a/slides/sep2016/lec2-4-seq-containers.pptx
+++ b/slides/sep2016/lec2-4-seq-containers.pptx
@@ -374,7 +374,7 @@
             <a:fld id="{96DFF08F-DC6B-4601-B491-B0F83F6DD2DA}" type="datetimeFigureOut">
               <a:rPr lang="en-US" dirty="0"/>
               <a:pPr/>
-              <a:t>5/18/2017</a:t>
+              <a:t>9/5/2017</a:t>
             </a:fld>
             <a:endParaRPr lang="en-US" dirty="0"/>
           </a:p>
@@ -591,7 +591,7 @@
           <a:p>
             <a:fld id="{96DFF08F-DC6B-4601-B491-B0F83F6DD2DA}" type="datetimeFigureOut">
               <a:rPr lang="en-US" dirty="0"/>
-              <a:t>5/18/2017</a:t>
+              <a:t>9/5/2017</a:t>
             </a:fld>
             <a:endParaRPr lang="en-US" dirty="0"/>
           </a:p>
@@ -766,7 +766,7 @@
           <a:p>
             <a:fld id="{96DFF08F-DC6B-4601-B491-B0F83F6DD2DA}" type="datetimeFigureOut">
               <a:rPr lang="en-US" dirty="0"/>
-              <a:t>5/18/2017</a:t>
+              <a:t>9/5/2017</a:t>
             </a:fld>
             <a:endParaRPr lang="en-US" dirty="0"/>
           </a:p>
@@ -931,7 +931,7 @@
           <a:p>
             <a:fld id="{96DFF08F-DC6B-4601-B491-B0F83F6DD2DA}" type="datetimeFigureOut">
               <a:rPr lang="en-US" dirty="0"/>
-              <a:t>5/18/2017</a:t>
+              <a:t>9/5/2017</a:t>
             </a:fld>
             <a:endParaRPr lang="en-US" dirty="0"/>
           </a:p>
@@ -1177,7 +1177,7 @@
           <a:p>
             <a:fld id="{96DFF08F-DC6B-4601-B491-B0F83F6DD2DA}" type="datetimeFigureOut">
               <a:rPr lang="en-US" dirty="0"/>
-              <a:t>5/18/2017</a:t>
+              <a:t>9/5/2017</a:t>
             </a:fld>
             <a:endParaRPr lang="en-US" dirty="0"/>
           </a:p>
@@ -1495,7 +1495,7 @@
           <a:p>
             <a:fld id="{96DFF08F-DC6B-4601-B491-B0F83F6DD2DA}" type="datetimeFigureOut">
               <a:rPr lang="en-US" dirty="0"/>
-              <a:t>5/18/2017</a:t>
+              <a:t>9/5/2017</a:t>
             </a:fld>
             <a:endParaRPr lang="en-US" dirty="0"/>
           </a:p>
@@ -1914,7 +1914,7 @@
           <a:p>
             <a:fld id="{96DFF08F-DC6B-4601-B491-B0F83F6DD2DA}" type="datetimeFigureOut">
               <a:rPr lang="en-US" dirty="0"/>
-              <a:t>5/18/2017</a:t>
+              <a:t>9/5/2017</a:t>
             </a:fld>
             <a:endParaRPr lang="en-US" dirty="0"/>
           </a:p>
@@ -2027,7 +2027,7 @@
           <a:p>
             <a:fld id="{96DFF08F-DC6B-4601-B491-B0F83F6DD2DA}" type="datetimeFigureOut">
               <a:rPr lang="en-US" dirty="0"/>
-              <a:t>5/18/2017</a:t>
+              <a:t>9/5/2017</a:t>
             </a:fld>
             <a:endParaRPr lang="en-US" dirty="0"/>
           </a:p>
@@ -2117,7 +2117,7 @@
           <a:p>
             <a:fld id="{96DFF08F-DC6B-4601-B491-B0F83F6DD2DA}" type="datetimeFigureOut">
               <a:rPr lang="en-US" dirty="0"/>
-              <a:t>5/18/2017</a:t>
+              <a:t>9/5/2017</a:t>
             </a:fld>
             <a:endParaRPr lang="en-US" dirty="0"/>
           </a:p>
@@ -2402,7 +2402,7 @@
           <a:p>
             <a:fld id="{96DFF08F-DC6B-4601-B491-B0F83F6DD2DA}" type="datetimeFigureOut">
               <a:rPr lang="en-US" dirty="0"/>
-              <a:t>5/18/2017</a:t>
+              <a:t>9/5/2017</a:t>
             </a:fld>
             <a:endParaRPr lang="en-US" dirty="0"/>
           </a:p>
@@ -2669,7 +2669,7 @@
           <a:p>
             <a:fld id="{96DFF08F-DC6B-4601-B491-B0F83F6DD2DA}" type="datetimeFigureOut">
               <a:rPr lang="en-US" dirty="0"/>
-              <a:t>5/18/2017</a:t>
+              <a:t>9/5/2017</a:t>
             </a:fld>
             <a:endParaRPr lang="en-US" dirty="0"/>
           </a:p>
@@ -2918,7 +2918,7 @@
             <a:fld id="{96DFF08F-DC6B-4601-B491-B0F83F6DD2DA}" type="datetimeFigureOut">
               <a:rPr lang="en-US" dirty="0"/>
               <a:pPr/>
-              <a:t>5/18/2017</a:t>
+              <a:t>9/5/2017</a:t>
             </a:fld>
             <a:endParaRPr lang="en-US" dirty="0"/>
           </a:p>
@@ -7320,96 +7320,84 @@
               <a:rPr lang="en-US" smtClean="0">
                 <a:latin typeface="Consolas" panose="020B0609020204030204" pitchFamily="49" charset="0"/>
               </a:rPr>
-              <a:t>  </a:t>
-            </a:r>
+              <a:t>    for </a:t>
+            </a:r>
+            <a:r>
+              <a:rPr lang="en-US" dirty="0" smtClean="0">
+                <a:latin typeface="Consolas" panose="020B0609020204030204" pitchFamily="49" charset="0"/>
+              </a:rPr>
+              <a:t>(auto </a:t>
+            </a:r>
+            <a:r>
+              <a:rPr lang="en-US" dirty="0" err="1" smtClean="0">
+                <a:latin typeface="Consolas" panose="020B0609020204030204" pitchFamily="49" charset="0"/>
+              </a:rPr>
+              <a:t>ili</a:t>
+            </a:r>
+            <a:r>
+              <a:rPr lang="en-US" dirty="0" smtClean="0">
+                <a:latin typeface="Consolas" panose="020B0609020204030204" pitchFamily="49" charset="0"/>
+              </a:rPr>
+              <a:t> = </a:t>
+            </a:r>
+            <a:r>
+              <a:rPr lang="en-US" dirty="0" err="1" smtClean="0">
+                <a:latin typeface="Consolas" panose="020B0609020204030204" pitchFamily="49" charset="0"/>
+              </a:rPr>
+              <a:t>il.begin</a:t>
+            </a:r>
+            <a:r>
+              <a:rPr lang="en-US" dirty="0" smtClean="0">
+                <a:latin typeface="Consolas" panose="020B0609020204030204" pitchFamily="49" charset="0"/>
+              </a:rPr>
+              <a:t>(); </a:t>
+            </a:r>
+            <a:r>
+              <a:rPr lang="en-US" dirty="0" err="1" smtClean="0">
+                <a:latin typeface="Consolas" panose="020B0609020204030204" pitchFamily="49" charset="0"/>
+              </a:rPr>
+              <a:t>ili</a:t>
+            </a:r>
+            <a:r>
+              <a:rPr lang="en-US" dirty="0" smtClean="0">
+                <a:latin typeface="Consolas" panose="020B0609020204030204" pitchFamily="49" charset="0"/>
+              </a:rPr>
+              <a:t> != </a:t>
+            </a:r>
+            <a:r>
+              <a:rPr lang="en-US" dirty="0" err="1" smtClean="0">
+                <a:latin typeface="Consolas" panose="020B0609020204030204" pitchFamily="49" charset="0"/>
+              </a:rPr>
+              <a:t>il.end</a:t>
+            </a:r>
+            <a:r>
+              <a:rPr lang="en-US" dirty="0" smtClean="0">
+                <a:latin typeface="Consolas" panose="020B0609020204030204" pitchFamily="49" charset="0"/>
+              </a:rPr>
+              <a:t>(); ++</a:t>
+            </a:r>
+            <a:r>
+              <a:rPr lang="en-US" dirty="0" err="1" smtClean="0">
+                <a:latin typeface="Consolas" panose="020B0609020204030204" pitchFamily="49" charset="0"/>
+              </a:rPr>
+              <a:t>ili</a:t>
+            </a:r>
+            <a:r>
+              <a:rPr lang="en-US" dirty="0" smtClean="0">
+                <a:latin typeface="Consolas" panose="020B0609020204030204" pitchFamily="49" charset="0"/>
+              </a:rPr>
+              <a:t>)</a:t>
+            </a:r>
+            <a:br>
+              <a:rPr lang="en-US" dirty="0" smtClean="0">
+                <a:latin typeface="Consolas" panose="020B0609020204030204" pitchFamily="49" charset="0"/>
+              </a:rPr>
+            </a:br>
             <a:r>
               <a:rPr lang="en-US" smtClean="0">
                 <a:latin typeface="Consolas" panose="020B0609020204030204" pitchFamily="49" charset="0"/>
               </a:rPr>
-              <a:t>  for </a:t>
-            </a:r>
-            <a:r>
-              <a:rPr lang="en-US" dirty="0" smtClean="0">
-                <a:latin typeface="Consolas" panose="020B0609020204030204" pitchFamily="49" charset="0"/>
-              </a:rPr>
-              <a:t>(auto </a:t>
-            </a:r>
-            <a:r>
-              <a:rPr lang="en-US" dirty="0" err="1" smtClean="0">
-                <a:latin typeface="Consolas" panose="020B0609020204030204" pitchFamily="49" charset="0"/>
-              </a:rPr>
-              <a:t>ili</a:t>
-            </a:r>
-            <a:r>
-              <a:rPr lang="en-US" dirty="0" smtClean="0">
-                <a:latin typeface="Consolas" panose="020B0609020204030204" pitchFamily="49" charset="0"/>
-              </a:rPr>
-              <a:t> = </a:t>
-            </a:r>
-            <a:r>
-              <a:rPr lang="en-US" dirty="0" err="1" smtClean="0">
-                <a:latin typeface="Consolas" panose="020B0609020204030204" pitchFamily="49" charset="0"/>
-              </a:rPr>
-              <a:t>il.begin</a:t>
-            </a:r>
-            <a:r>
-              <a:rPr lang="en-US" dirty="0" smtClean="0">
-                <a:latin typeface="Consolas" panose="020B0609020204030204" pitchFamily="49" charset="0"/>
-              </a:rPr>
-              <a:t>(); </a:t>
-            </a:r>
-            <a:r>
-              <a:rPr lang="en-US" dirty="0" err="1" smtClean="0">
-                <a:latin typeface="Consolas" panose="020B0609020204030204" pitchFamily="49" charset="0"/>
-              </a:rPr>
-              <a:t>ili</a:t>
-            </a:r>
-            <a:r>
-              <a:rPr lang="en-US" dirty="0" smtClean="0">
-                <a:latin typeface="Consolas" panose="020B0609020204030204" pitchFamily="49" charset="0"/>
-              </a:rPr>
-              <a:t> != </a:t>
-            </a:r>
-            <a:r>
-              <a:rPr lang="en-US" dirty="0" err="1" smtClean="0">
-                <a:latin typeface="Consolas" panose="020B0609020204030204" pitchFamily="49" charset="0"/>
-              </a:rPr>
-              <a:t>il.end</a:t>
-            </a:r>
-            <a:r>
-              <a:rPr lang="en-US" dirty="0" smtClean="0">
-                <a:latin typeface="Consolas" panose="020B0609020204030204" pitchFamily="49" charset="0"/>
-              </a:rPr>
-              <a:t>(); ++</a:t>
-            </a:r>
-            <a:r>
-              <a:rPr lang="en-US" dirty="0" err="1" smtClean="0">
-                <a:latin typeface="Consolas" panose="020B0609020204030204" pitchFamily="49" charset="0"/>
-              </a:rPr>
-              <a:t>ili</a:t>
-            </a:r>
-            <a:r>
-              <a:rPr lang="en-US" dirty="0" smtClean="0">
-                <a:latin typeface="Consolas" panose="020B0609020204030204" pitchFamily="49" charset="0"/>
-              </a:rPr>
-              <a:t>)</a:t>
-            </a:r>
-            <a:br>
-              <a:rPr lang="en-US" dirty="0" smtClean="0">
-                <a:latin typeface="Consolas" panose="020B0609020204030204" pitchFamily="49" charset="0"/>
-              </a:rPr>
-            </a:br>
-            <a:r>
-              <a:rPr lang="en-US" smtClean="0">
-                <a:latin typeface="Consolas" panose="020B0609020204030204" pitchFamily="49" charset="0"/>
-              </a:rPr>
-              <a:t>    </a:t>
-            </a:r>
-            <a:r>
-              <a:rPr lang="en-US" smtClean="0">
-                <a:latin typeface="Consolas" panose="020B0609020204030204" pitchFamily="49" charset="0"/>
-              </a:rPr>
-              <a:t>  add_node</a:t>
+              <a:t>      add_node</a:t>
             </a:r>
             <a:r>
               <a:rPr lang="en-US" dirty="0" smtClean="0">
@@ -25819,7 +25807,19 @@
               <a:rPr lang="en-US" dirty="0" smtClean="0">
                 <a:latin typeface="Consolas" panose="020B0609020204030204" pitchFamily="49" charset="0"/>
               </a:rPr>
-              <a:t> = 0, </a:t>
+              <a:t> </a:t>
+            </a:r>
+            <a:r>
+              <a:rPr lang="en-US" smtClean="0">
+                <a:latin typeface="Consolas" panose="020B0609020204030204" pitchFamily="49" charset="0"/>
+              </a:rPr>
+              <a:t>= </a:t>
+            </a:r>
+            <a:r>
+              <a:rPr lang="en-US" smtClean="0">
+                <a:latin typeface="Consolas" panose="020B0609020204030204" pitchFamily="49" charset="0"/>
+              </a:rPr>
+              <a:t>0; </a:t>
             </a:r>
             <a:r>
               <a:rPr lang="en-US" dirty="0" err="1" smtClean="0">
@@ -25831,19 +25831,19 @@
               <a:rPr lang="en-US" dirty="0" smtClean="0">
                 <a:latin typeface="Consolas" panose="020B0609020204030204" pitchFamily="49" charset="0"/>
               </a:rPr>
-              <a:t> != </a:t>
-            </a:r>
-            <a:r>
-              <a:rPr lang="en-US" dirty="0">
-                <a:latin typeface="Consolas" panose="020B0609020204030204" pitchFamily="49" charset="0"/>
-              </a:rPr>
-              <a:t>n/3</a:t>
-            </a:r>
-            <a:r>
-              <a:rPr lang="en-US" dirty="0" smtClean="0">
-                <a:latin typeface="Consolas" panose="020B0609020204030204" pitchFamily="49" charset="0"/>
-              </a:rPr>
-              <a:t>, </a:t>
+              <a:t> </a:t>
+            </a:r>
+            <a:r>
+              <a:rPr lang="en-US" smtClean="0">
+                <a:latin typeface="Consolas" panose="020B0609020204030204" pitchFamily="49" charset="0"/>
+              </a:rPr>
+              <a:t>!= </a:t>
+            </a:r>
+            <a:r>
+              <a:rPr lang="en-US" smtClean="0">
+                <a:latin typeface="Consolas" panose="020B0609020204030204" pitchFamily="49" charset="0"/>
+              </a:rPr>
+              <a:t>n; </a:t>
             </a:r>
             <a:r>
               <a:rPr lang="en-US" dirty="0" err="1" smtClean="0">

</xml_diff>